<commit_message>
implemented if in jinja
</commit_message>
<xml_diff>
--- a/templates/template.pptx
+++ b/templates/template.pptx
@@ -340,7 +340,7 @@
             <a:fld id="{1D8BD707-D9CF-40AE-B4C6-C98DA3205C09}" type="datetimeFigureOut">
               <a:rPr lang="en-US" smtClean="0"/>
               <a:pPr/>
-              <a:t>11/19/2023</a:t>
+              <a:t>11/20/2023</a:t>
             </a:fld>
             <a:endParaRPr lang="en-US"/>
           </a:p>
@@ -505,7 +505,7 @@
             <a:fld id="{1D8BD707-D9CF-40AE-B4C6-C98DA3205C09}" type="datetimeFigureOut">
               <a:rPr lang="en-US" smtClean="0"/>
               <a:pPr/>
-              <a:t>11/19/2023</a:t>
+              <a:t>11/20/2023</a:t>
             </a:fld>
             <a:endParaRPr lang="en-US"/>
           </a:p>
@@ -680,7 +680,7 @@
             <a:fld id="{1D8BD707-D9CF-40AE-B4C6-C98DA3205C09}" type="datetimeFigureOut">
               <a:rPr lang="en-US" smtClean="0"/>
               <a:pPr/>
-              <a:t>11/19/2023</a:t>
+              <a:t>11/20/2023</a:t>
             </a:fld>
             <a:endParaRPr lang="en-US"/>
           </a:p>
@@ -845,7 +845,7 @@
             <a:fld id="{1D8BD707-D9CF-40AE-B4C6-C98DA3205C09}" type="datetimeFigureOut">
               <a:rPr lang="en-US" smtClean="0"/>
               <a:pPr/>
-              <a:t>11/19/2023</a:t>
+              <a:t>11/20/2023</a:t>
             </a:fld>
             <a:endParaRPr lang="en-US"/>
           </a:p>
@@ -1087,7 +1087,7 @@
             <a:fld id="{1D8BD707-D9CF-40AE-B4C6-C98DA3205C09}" type="datetimeFigureOut">
               <a:rPr lang="en-US" smtClean="0"/>
               <a:pPr/>
-              <a:t>11/19/2023</a:t>
+              <a:t>11/20/2023</a:t>
             </a:fld>
             <a:endParaRPr lang="en-US"/>
           </a:p>
@@ -1369,7 +1369,7 @@
             <a:fld id="{1D8BD707-D9CF-40AE-B4C6-C98DA3205C09}" type="datetimeFigureOut">
               <a:rPr lang="en-US" smtClean="0"/>
               <a:pPr/>
-              <a:t>11/19/2023</a:t>
+              <a:t>11/20/2023</a:t>
             </a:fld>
             <a:endParaRPr lang="en-US"/>
           </a:p>
@@ -1785,7 +1785,7 @@
             <a:fld id="{1D8BD707-D9CF-40AE-B4C6-C98DA3205C09}" type="datetimeFigureOut">
               <a:rPr lang="en-US" smtClean="0"/>
               <a:pPr/>
-              <a:t>11/19/2023</a:t>
+              <a:t>11/20/2023</a:t>
             </a:fld>
             <a:endParaRPr lang="en-US"/>
           </a:p>
@@ -1899,7 +1899,7 @@
             <a:fld id="{1D8BD707-D9CF-40AE-B4C6-C98DA3205C09}" type="datetimeFigureOut">
               <a:rPr lang="en-US" smtClean="0"/>
               <a:pPr/>
-              <a:t>11/19/2023</a:t>
+              <a:t>11/20/2023</a:t>
             </a:fld>
             <a:endParaRPr lang="en-US"/>
           </a:p>
@@ -1991,7 +1991,7 @@
             <a:fld id="{1D8BD707-D9CF-40AE-B4C6-C98DA3205C09}" type="datetimeFigureOut">
               <a:rPr lang="en-US" smtClean="0"/>
               <a:pPr/>
-              <a:t>11/19/2023</a:t>
+              <a:t>11/20/2023</a:t>
             </a:fld>
             <a:endParaRPr lang="en-US"/>
           </a:p>
@@ -2263,7 +2263,7 @@
             <a:fld id="{1D8BD707-D9CF-40AE-B4C6-C98DA3205C09}" type="datetimeFigureOut">
               <a:rPr lang="en-US" smtClean="0"/>
               <a:pPr/>
-              <a:t>11/19/2023</a:t>
+              <a:t>11/20/2023</a:t>
             </a:fld>
             <a:endParaRPr lang="en-US"/>
           </a:p>
@@ -2512,7 +2512,7 @@
             <a:fld id="{1D8BD707-D9CF-40AE-B4C6-C98DA3205C09}" type="datetimeFigureOut">
               <a:rPr lang="en-US" smtClean="0"/>
               <a:pPr/>
-              <a:t>11/19/2023</a:t>
+              <a:t>11/20/2023</a:t>
             </a:fld>
             <a:endParaRPr lang="en-US"/>
           </a:p>
@@ -2720,7 +2720,7 @@
             <a:fld id="{1D8BD707-D9CF-40AE-B4C6-C98DA3205C09}" type="datetimeFigureOut">
               <a:rPr lang="en-US" smtClean="0"/>
               <a:pPr/>
-              <a:t>11/19/2023</a:t>
+              <a:t>11/20/2023</a:t>
             </a:fld>
             <a:endParaRPr lang="en-US"/>
           </a:p>
@@ -3239,44 +3239,6 @@
       </p:sp>
       <p:sp>
         <p:nvSpPr>
-          <p:cNvPr id="5" name="TextBox 5"/>
-          <p:cNvSpPr txBox="1"/>
-          <p:nvPr/>
-        </p:nvSpPr>
-        <p:spPr>
-          <a:xfrm>
-            <a:off x="3103258" y="1415489"/>
-            <a:ext cx="9456330" cy="778432"/>
-          </a:xfrm>
-          <a:prstGeom prst="rect">
-            <a:avLst/>
-          </a:prstGeom>
-        </p:spPr>
-        <p:txBody>
-          <a:bodyPr lIns="0" tIns="0" rIns="0" bIns="0" rtlCol="0" anchor="t">
-            <a:spAutoFit/>
-          </a:bodyPr>
-          <a:lstStyle/>
-          <a:p>
-            <a:pPr>
-              <a:lnSpc>
-                <a:spcPts val="5469"/>
-              </a:lnSpc>
-            </a:pPr>
-            <a:r>
-              <a:rPr lang="en-US" sz="4520">
-                <a:solidFill>
-                  <a:srgbClr val="D40C0C"/>
-                </a:solidFill>
-                <a:latin typeface="Times New Roman Bold"/>
-              </a:rPr>
-              <a:t>Метро:</a:t>
-            </a:r>
-          </a:p>
-        </p:txBody>
-      </p:sp>
-      <p:sp>
-        <p:nvSpPr>
           <p:cNvPr id="6" name="TextBox 6"/>
           <p:cNvSpPr txBox="1"/>
           <p:nvPr/>
@@ -3398,13 +3360,13 @@
       </p:sp>
       <p:sp>
         <p:nvSpPr>
-          <p:cNvPr id="9" name="TextBox 9"/>
+          <p:cNvPr id="10" name="TextBox 10"/>
           <p:cNvSpPr txBox="1"/>
           <p:nvPr/>
         </p:nvSpPr>
         <p:spPr>
           <a:xfrm>
-            <a:off x="6908778" y="1532090"/>
+            <a:off x="6908778" y="2275678"/>
             <a:ext cx="12368387" cy="529569"/>
           </a:xfrm>
           <a:prstGeom prst="rect">
@@ -3438,7 +3400,7 @@
                 </a:solidFill>
                 <a:latin typeface="Times New Roman"/>
               </a:rPr>
-              <a:t>subway_stations</a:t>
+              <a:t>region_name</a:t>
             </a:r>
             <a:r>
               <a:rPr lang="en-US" sz="3219" u="sng" dirty="0">
@@ -3454,20 +3416,20 @@
                 <a:srgbClr val="FFFFFF"/>
               </a:solidFill>
               <a:latin typeface="Times New Roman"/>
-              <a:hlinkClick r:id="rId6" tooltip="https://www.moscowmap.ru/metro/arbatsko-pokrovskaya-linija/pervomayskaya.html"/>
+              <a:hlinkClick r:id="rId6" tooltip="https://www.moscowmap.ru/okruga/yuzao.html"/>
             </a:endParaRPr>
           </a:p>
         </p:txBody>
       </p:sp>
       <p:sp>
         <p:nvSpPr>
-          <p:cNvPr id="10" name="TextBox 10"/>
+          <p:cNvPr id="11" name="TextBox 11"/>
           <p:cNvSpPr txBox="1"/>
           <p:nvPr/>
         </p:nvSpPr>
         <p:spPr>
           <a:xfrm>
-            <a:off x="6908778" y="2275678"/>
+            <a:off x="6908778" y="2969366"/>
             <a:ext cx="12368387" cy="529569"/>
           </a:xfrm>
           <a:prstGeom prst="rect">
@@ -3501,7 +3463,7 @@
                 </a:solidFill>
                 <a:latin typeface="Times New Roman"/>
               </a:rPr>
-              <a:t>region_name</a:t>
+              <a:t>district_name</a:t>
             </a:r>
             <a:r>
               <a:rPr lang="en-US" sz="3219" u="sng" dirty="0">
@@ -3517,39 +3479,187 @@
                 <a:srgbClr val="FFFFFF"/>
               </a:solidFill>
               <a:latin typeface="Times New Roman"/>
-              <a:hlinkClick r:id="rId7" tooltip="https://www.moscowmap.ru/okruga/yuzao.html"/>
+              <a:hlinkClick r:id="rId7" tooltip="https://www.moscowmap.ru/okruga/vao/izmaylovo.html"/>
             </a:endParaRPr>
           </a:p>
         </p:txBody>
       </p:sp>
       <p:sp>
         <p:nvSpPr>
-          <p:cNvPr id="11" name="TextBox 11"/>
+          <p:cNvPr id="12" name="TextBox 5">
+            <a:extLst>
+              <a:ext uri="{FF2B5EF4-FFF2-40B4-BE49-F238E27FC236}">
+                <a16:creationId xmlns:a16="http://schemas.microsoft.com/office/drawing/2014/main" id="{21CE20D1-04E5-5EB0-4FE0-9FFE792E1182}"/>
+              </a:ext>
+            </a:extLst>
+          </p:cNvPr>
           <p:cNvSpPr txBox="1"/>
           <p:nvPr/>
         </p:nvSpPr>
         <p:spPr>
           <a:xfrm>
-            <a:off x="6908778" y="2969366"/>
-            <a:ext cx="12368387" cy="529569"/>
+            <a:off x="1156412" y="1435320"/>
+            <a:ext cx="11416588" cy="685765"/>
           </a:xfrm>
           <a:prstGeom prst="rect">
             <a:avLst/>
           </a:prstGeom>
         </p:spPr>
         <p:txBody>
-          <a:bodyPr lIns="0" tIns="0" rIns="0" bIns="0" rtlCol="0" anchor="t">
+          <a:bodyPr wrap="square" lIns="0" tIns="0" rIns="0" bIns="0" rtlCol="0" anchor="t">
             <a:spAutoFit/>
           </a:bodyPr>
-          <a:lstStyle/>
-          <a:p>
-            <a:pPr algn="just">
+          <a:lstStyle>
+            <a:defPPr>
+              <a:defRPr lang="en-US"/>
+            </a:defPPr>
+            <a:lvl1pPr marL="0" algn="l" defTabSz="914400" rtl="0" eaLnBrk="1" latinLnBrk="0" hangingPunct="1">
+              <a:defRPr sz="1800" kern="1200">
+                <a:solidFill>
+                  <a:schemeClr val="tx1"/>
+                </a:solidFill>
+                <a:latin typeface="+mn-lt"/>
+                <a:ea typeface="+mn-ea"/>
+                <a:cs typeface="+mn-cs"/>
+              </a:defRPr>
+            </a:lvl1pPr>
+            <a:lvl2pPr marL="457200" algn="l" defTabSz="914400" rtl="0" eaLnBrk="1" latinLnBrk="0" hangingPunct="1">
+              <a:defRPr sz="1800" kern="1200">
+                <a:solidFill>
+                  <a:schemeClr val="tx1"/>
+                </a:solidFill>
+                <a:latin typeface="+mn-lt"/>
+                <a:ea typeface="+mn-ea"/>
+                <a:cs typeface="+mn-cs"/>
+              </a:defRPr>
+            </a:lvl2pPr>
+            <a:lvl3pPr marL="914400" algn="l" defTabSz="914400" rtl="0" eaLnBrk="1" latinLnBrk="0" hangingPunct="1">
+              <a:defRPr sz="1800" kern="1200">
+                <a:solidFill>
+                  <a:schemeClr val="tx1"/>
+                </a:solidFill>
+                <a:latin typeface="+mn-lt"/>
+                <a:ea typeface="+mn-ea"/>
+                <a:cs typeface="+mn-cs"/>
+              </a:defRPr>
+            </a:lvl3pPr>
+            <a:lvl4pPr marL="1371600" algn="l" defTabSz="914400" rtl="0" eaLnBrk="1" latinLnBrk="0" hangingPunct="1">
+              <a:defRPr sz="1800" kern="1200">
+                <a:solidFill>
+                  <a:schemeClr val="tx1"/>
+                </a:solidFill>
+                <a:latin typeface="+mn-lt"/>
+                <a:ea typeface="+mn-ea"/>
+                <a:cs typeface="+mn-cs"/>
+              </a:defRPr>
+            </a:lvl4pPr>
+            <a:lvl5pPr marL="1828800" algn="l" defTabSz="914400" rtl="0" eaLnBrk="1" latinLnBrk="0" hangingPunct="1">
+              <a:defRPr sz="1800" kern="1200">
+                <a:solidFill>
+                  <a:schemeClr val="tx1"/>
+                </a:solidFill>
+                <a:latin typeface="+mn-lt"/>
+                <a:ea typeface="+mn-ea"/>
+                <a:cs typeface="+mn-cs"/>
+              </a:defRPr>
+            </a:lvl5pPr>
+            <a:lvl6pPr marL="2286000" algn="l" defTabSz="914400" rtl="0" eaLnBrk="1" latinLnBrk="0" hangingPunct="1">
+              <a:defRPr sz="1800" kern="1200">
+                <a:solidFill>
+                  <a:schemeClr val="tx1"/>
+                </a:solidFill>
+                <a:latin typeface="+mn-lt"/>
+                <a:ea typeface="+mn-ea"/>
+                <a:cs typeface="+mn-cs"/>
+              </a:defRPr>
+            </a:lvl6pPr>
+            <a:lvl7pPr marL="2743200" algn="l" defTabSz="914400" rtl="0" eaLnBrk="1" latinLnBrk="0" hangingPunct="1">
+              <a:defRPr sz="1800" kern="1200">
+                <a:solidFill>
+                  <a:schemeClr val="tx1"/>
+                </a:solidFill>
+                <a:latin typeface="+mn-lt"/>
+                <a:ea typeface="+mn-ea"/>
+                <a:cs typeface="+mn-cs"/>
+              </a:defRPr>
+            </a:lvl7pPr>
+            <a:lvl8pPr marL="3200400" algn="l" defTabSz="914400" rtl="0" eaLnBrk="1" latinLnBrk="0" hangingPunct="1">
+              <a:defRPr sz="1800" kern="1200">
+                <a:solidFill>
+                  <a:schemeClr val="tx1"/>
+                </a:solidFill>
+                <a:latin typeface="+mn-lt"/>
+                <a:ea typeface="+mn-ea"/>
+                <a:cs typeface="+mn-cs"/>
+              </a:defRPr>
+            </a:lvl8pPr>
+            <a:lvl9pPr marL="3657600" algn="l" defTabSz="914400" rtl="0" eaLnBrk="1" latinLnBrk="0" hangingPunct="1">
+              <a:defRPr sz="1800" kern="1200">
+                <a:solidFill>
+                  <a:schemeClr val="tx1"/>
+                </a:solidFill>
+                <a:latin typeface="+mn-lt"/>
+                <a:ea typeface="+mn-ea"/>
+                <a:cs typeface="+mn-cs"/>
+              </a:defRPr>
+            </a:lvl9pPr>
+          </a:lstStyle>
+          <a:p>
+            <a:pPr>
               <a:lnSpc>
-                <a:spcPts val="4506"/>
+                <a:spcPts val="5469"/>
               </a:lnSpc>
             </a:pPr>
             <a:r>
-              <a:rPr lang="en-US" sz="3219" u="sng" dirty="0">
+              <a:rPr lang="en-US" sz="1400" dirty="0">
+                <a:solidFill>
+                  <a:srgbClr val="D40C0C"/>
+                </a:solidFill>
+                <a:latin typeface="Times New Roman" panose="02020603050405020304" pitchFamily="18" charset="0"/>
+                <a:cs typeface="Times New Roman" panose="02020603050405020304" pitchFamily="18" charset="0"/>
+              </a:rPr>
+              <a:t>{% if </a:t>
+            </a:r>
+            <a:r>
+              <a:rPr lang="en-US" sz="1400" u="sng" dirty="0" err="1">
+                <a:solidFill>
+                  <a:srgbClr val="FFFFFF"/>
+                </a:solidFill>
+                <a:latin typeface="Times New Roman" panose="02020603050405020304" pitchFamily="18" charset="0"/>
+                <a:cs typeface="Times New Roman" panose="02020603050405020304" pitchFamily="18" charset="0"/>
+              </a:rPr>
+              <a:t>subway_stations</a:t>
+            </a:r>
+            <a:r>
+              <a:rPr lang="en-US" sz="1400" u="sng" dirty="0">
+                <a:solidFill>
+                  <a:srgbClr val="FFFFFF"/>
+                </a:solidFill>
+                <a:latin typeface="Times New Roman" panose="02020603050405020304" pitchFamily="18" charset="0"/>
+                <a:cs typeface="Times New Roman" panose="02020603050405020304" pitchFamily="18" charset="0"/>
+              </a:rPr>
+              <a:t> %} </a:t>
+            </a:r>
+            <a:r>
+              <a:rPr lang="en-US" sz="4520" dirty="0" err="1">
+                <a:solidFill>
+                  <a:srgbClr val="D40C0C"/>
+                </a:solidFill>
+                <a:latin typeface="Times New Roman Bold"/>
+              </a:rPr>
+              <a:t>Метро</a:t>
+            </a:r>
+            <a:r>
+              <a:rPr lang="en-US" sz="4520" dirty="0">
+                <a:solidFill>
+                  <a:srgbClr val="D40C0C"/>
+                </a:solidFill>
+                <a:latin typeface="Times New Roman Bold"/>
+              </a:rPr>
+              <a:t>:              </a:t>
+            </a:r>
+            <a:r>
+              <a:rPr lang="en-US" sz="3300" u="sng" dirty="0">
                 <a:solidFill>
                   <a:srgbClr val="FFFFFF"/>
                 </a:solidFill>
@@ -3558,29 +3668,37 @@
               <a:t>{{ </a:t>
             </a:r>
             <a:r>
-              <a:rPr lang="en-US" sz="3219" u="sng" dirty="0" err="1">
+              <a:rPr lang="en-US" sz="3300" u="sng" dirty="0" err="1">
                 <a:solidFill>
                   <a:srgbClr val="FFFFFF"/>
                 </a:solidFill>
                 <a:latin typeface="Times New Roman"/>
               </a:rPr>
-              <a:t>district_name</a:t>
-            </a:r>
-            <a:r>
-              <a:rPr lang="en-US" sz="3219" u="sng" dirty="0">
+              <a:t>subway_stations</a:t>
+            </a:r>
+            <a:r>
+              <a:rPr lang="en-US" sz="3300" u="sng" dirty="0">
                 <a:solidFill>
                   <a:srgbClr val="FFFFFF"/>
                 </a:solidFill>
                 <a:latin typeface="Times New Roman"/>
               </a:rPr>
-              <a:t> }}</a:t>
-            </a:r>
-            <a:endParaRPr lang="en-US" sz="3219" u="sng" dirty="0">
+              <a:t> }} </a:t>
+            </a:r>
+            <a:r>
+              <a:rPr lang="en-US" sz="1200" u="sng" dirty="0">
+                <a:solidFill>
+                  <a:srgbClr val="FFFFFF"/>
+                </a:solidFill>
+                <a:latin typeface="Times New Roman"/>
+              </a:rPr>
+              <a:t>{% endif %}</a:t>
+            </a:r>
+            <a:endParaRPr lang="en-US" sz="3300" dirty="0">
               <a:solidFill>
-                <a:srgbClr val="FFFFFF"/>
+                <a:srgbClr val="D40C0C"/>
               </a:solidFill>
-              <a:latin typeface="Times New Roman"/>
-              <a:hlinkClick r:id="rId8" tooltip="https://www.moscowmap.ru/okruga/vao/izmaylovo.html"/>
+              <a:latin typeface="Times New Roman Bold"/>
             </a:endParaRPr>
           </a:p>
         </p:txBody>

</xml_diff>

<commit_message>
have no time to think about commit message
</commit_message>
<xml_diff>
--- a/templates/template.pptx
+++ b/templates/template.pptx
@@ -3321,7 +3321,7 @@
         </p:nvSpPr>
         <p:spPr>
           <a:xfrm>
-            <a:off x="6908778" y="788294"/>
+            <a:off x="6894030" y="788294"/>
             <a:ext cx="17141074" cy="541495"/>
           </a:xfrm>
           <a:prstGeom prst="rect">
@@ -3346,7 +3346,7 @@
                 </a:solidFill>
                 <a:latin typeface="Times New Roman"/>
               </a:rPr>
-              <a:t>{{ address }}</a:t>
+              <a:t>{% if address %} {{ address }} {% endif %}</a:t>
             </a:r>
             <a:endParaRPr lang="en-US" sz="3296" u="sng" dirty="0">
               <a:solidFill>
@@ -3385,6 +3385,33 @@
               </a:lnSpc>
             </a:pPr>
             <a:r>
+              <a:rPr lang="en-US" sz="3200" u="sng" dirty="0">
+                <a:solidFill>
+                  <a:srgbClr val="FFFFFF"/>
+                </a:solidFill>
+                <a:latin typeface="Times New Roman"/>
+              </a:rPr>
+              <a:t>{% if </a:t>
+            </a:r>
+            <a:r>
+              <a:rPr lang="en-US" sz="3200" u="sng" dirty="0" err="1">
+                <a:solidFill>
+                  <a:srgbClr val="FFFFFF"/>
+                </a:solidFill>
+                <a:latin typeface="Times New Roman"/>
+              </a:rPr>
+              <a:t>region_name</a:t>
+            </a:r>
+            <a:r>
+              <a:rPr lang="en-US" sz="3200" u="sng" dirty="0">
+                <a:solidFill>
+                  <a:srgbClr val="FFFFFF"/>
+                </a:solidFill>
+                <a:latin typeface="Times New Roman"/>
+              </a:rPr>
+              <a:t> %} </a:t>
+            </a:r>
+            <a:r>
               <a:rPr lang="en-US" sz="3219" u="sng" dirty="0">
                 <a:solidFill>
                   <a:srgbClr val="FFFFFF"/>
@@ -3409,7 +3436,16 @@
                 </a:solidFill>
                 <a:latin typeface="Times New Roman"/>
               </a:rPr>
-              <a:t> }}</a:t>
+              <a:t> }} </a:t>
+            </a:r>
+            <a:r>
+              <a:rPr lang="en-US" sz="3200" u="sng" dirty="0">
+                <a:solidFill>
+                  <a:srgbClr val="FFFFFF"/>
+                </a:solidFill>
+                <a:latin typeface="Times New Roman"/>
+              </a:rPr>
+              <a:t>{% endif %}</a:t>
             </a:r>
             <a:endParaRPr lang="en-US" sz="3219" u="sng" dirty="0">
               <a:solidFill>
@@ -3429,8 +3465,8 @@
         </p:nvSpPr>
         <p:spPr>
           <a:xfrm>
-            <a:off x="6908778" y="2969366"/>
-            <a:ext cx="12368387" cy="529569"/>
+            <a:off x="6858000" y="2969366"/>
+            <a:ext cx="12368387" cy="540982"/>
           </a:xfrm>
           <a:prstGeom prst="rect">
             <a:avLst/>
@@ -3448,6 +3484,33 @@
               </a:lnSpc>
             </a:pPr>
             <a:r>
+              <a:rPr lang="en-US" sz="3600" u="sng" dirty="0">
+                <a:solidFill>
+                  <a:srgbClr val="FFFFFF"/>
+                </a:solidFill>
+                <a:latin typeface="Times New Roman"/>
+              </a:rPr>
+              <a:t>{% if </a:t>
+            </a:r>
+            <a:r>
+              <a:rPr lang="en-US" sz="3600" u="sng" dirty="0" err="1">
+                <a:solidFill>
+                  <a:srgbClr val="FFFFFF"/>
+                </a:solidFill>
+                <a:latin typeface="Times New Roman"/>
+              </a:rPr>
+              <a:t>district_name</a:t>
+            </a:r>
+            <a:r>
+              <a:rPr lang="en-US" sz="3600" u="sng" dirty="0">
+                <a:solidFill>
+                  <a:srgbClr val="FFFFFF"/>
+                </a:solidFill>
+                <a:latin typeface="Times New Roman"/>
+              </a:rPr>
+              <a:t> %} </a:t>
+            </a:r>
+            <a:r>
               <a:rPr lang="en-US" sz="3219" u="sng" dirty="0">
                 <a:solidFill>
                   <a:srgbClr val="FFFFFF"/>
@@ -3472,7 +3535,16 @@
                 </a:solidFill>
                 <a:latin typeface="Times New Roman"/>
               </a:rPr>
-              <a:t> }}</a:t>
+              <a:t> }} </a:t>
+            </a:r>
+            <a:r>
+              <a:rPr lang="en-US" sz="3200" u="sng" dirty="0">
+                <a:solidFill>
+                  <a:srgbClr val="FFFFFF"/>
+                </a:solidFill>
+                <a:latin typeface="Times New Roman"/>
+              </a:rPr>
+              <a:t>{% endif %}</a:t>
             </a:r>
             <a:endParaRPr lang="en-US" sz="3219" u="sng" dirty="0">
               <a:solidFill>
@@ -4234,15 +4306,15 @@
         </p:nvSpPr>
         <p:spPr>
           <a:xfrm>
-            <a:off x="1637934" y="6396027"/>
-            <a:ext cx="1688125" cy="775749"/>
+            <a:off x="-103830" y="6353241"/>
+            <a:ext cx="11381430" cy="692497"/>
           </a:xfrm>
           <a:prstGeom prst="rect">
             <a:avLst/>
           </a:prstGeom>
         </p:spPr>
         <p:txBody>
-          <a:bodyPr lIns="0" tIns="0" rIns="0" bIns="0" rtlCol="0" anchor="t">
+          <a:bodyPr wrap="square" lIns="0" tIns="0" rIns="0" bIns="0" rtlCol="0" anchor="t">
             <a:spAutoFit/>
           </a:bodyPr>
           <a:lstStyle/>
@@ -4253,14 +4325,56 @@
               </a:lnSpc>
             </a:pPr>
             <a:r>
-              <a:rPr lang="en-US" sz="4502">
+              <a:rPr lang="en-US" dirty="0">
                 <a:solidFill>
                   <a:srgbClr val="D40C0C"/>
                 </a:solidFill>
                 <a:latin typeface="Times New Roman Bold"/>
               </a:rPr>
-              <a:t>Окна:</a:t>
-            </a:r>
+              <a:t>{% if windows %} </a:t>
+            </a:r>
+            <a:r>
+              <a:rPr lang="en-US" sz="4502" dirty="0" err="1">
+                <a:solidFill>
+                  <a:srgbClr val="D40C0C"/>
+                </a:solidFill>
+                <a:latin typeface="Times New Roman Bold"/>
+              </a:rPr>
+              <a:t>Окна</a:t>
+            </a:r>
+            <a:r>
+              <a:rPr lang="en-US" sz="4502" dirty="0">
+                <a:solidFill>
+                  <a:srgbClr val="D40C0C"/>
+                </a:solidFill>
+                <a:latin typeface="Times New Roman Bold"/>
+              </a:rPr>
+              <a:t>:</a:t>
+            </a:r>
+            <a:r>
+              <a:rPr lang="en-US" sz="3200" dirty="0">
+                <a:solidFill>
+                  <a:srgbClr val="D40C0C"/>
+                </a:solidFill>
+                <a:latin typeface="Times New Roman Bold"/>
+              </a:rPr>
+              <a:t>                                  </a:t>
+            </a:r>
+            <a:r>
+              <a:rPr lang="en-US" sz="3200" dirty="0">
+                <a:solidFill>
+                  <a:schemeClr val="bg1"/>
+                </a:solidFill>
+                <a:latin typeface="Times New Roman Bold"/>
+              </a:rPr>
+              <a:t>{{ windows }} {% endif %}</a:t>
+            </a:r>
+            <a:endParaRPr lang="en-US" sz="4502" dirty="0">
+              <a:solidFill>
+                <a:schemeClr val="bg1"/>
+              </a:solidFill>
+              <a:latin typeface="Times New Roman Bold"/>
+            </a:endParaRPr>
           </a:p>
         </p:txBody>
       </p:sp>
@@ -4272,15 +4386,15 @@
         </p:nvSpPr>
         <p:spPr>
           <a:xfrm>
-            <a:off x="1637934" y="7033773"/>
-            <a:ext cx="2739661" cy="775749"/>
+            <a:off x="-103830" y="7033773"/>
+            <a:ext cx="11381430" cy="692497"/>
           </a:xfrm>
           <a:prstGeom prst="rect">
             <a:avLst/>
           </a:prstGeom>
         </p:spPr>
         <p:txBody>
-          <a:bodyPr lIns="0" tIns="0" rIns="0" bIns="0" rtlCol="0" anchor="t">
+          <a:bodyPr wrap="square" lIns="0" tIns="0" rIns="0" bIns="0" rtlCol="0" anchor="t">
             <a:spAutoFit/>
           </a:bodyPr>
           <a:lstStyle/>
@@ -4291,14 +4405,56 @@
               </a:lnSpc>
             </a:pPr>
             <a:r>
-              <a:rPr lang="en-US" sz="4502">
+              <a:rPr lang="en-US" dirty="0">
                 <a:solidFill>
                   <a:srgbClr val="D40C0C"/>
                 </a:solidFill>
                 <a:latin typeface="Times New Roman Bold"/>
               </a:rPr>
-              <a:t>Потолки:</a:t>
-            </a:r>
+              <a:t>{% if ceilings %} </a:t>
+            </a:r>
+            <a:r>
+              <a:rPr lang="en-US" sz="4502" dirty="0" err="1">
+                <a:solidFill>
+                  <a:srgbClr val="D40C0C"/>
+                </a:solidFill>
+                <a:latin typeface="Times New Roman Bold"/>
+              </a:rPr>
+              <a:t>Потолки</a:t>
+            </a:r>
+            <a:r>
+              <a:rPr lang="en-US" sz="4502" dirty="0">
+                <a:solidFill>
+                  <a:srgbClr val="D40C0C"/>
+                </a:solidFill>
+                <a:latin typeface="Times New Roman Bold"/>
+              </a:rPr>
+              <a:t>:</a:t>
+            </a:r>
+            <a:r>
+              <a:rPr lang="en-US" sz="3200" dirty="0">
+                <a:solidFill>
+                  <a:srgbClr val="D40C0C"/>
+                </a:solidFill>
+                <a:latin typeface="Times New Roman Bold"/>
+              </a:rPr>
+              <a:t>                          </a:t>
+            </a:r>
+            <a:r>
+              <a:rPr lang="en-US" sz="3200" dirty="0">
+                <a:solidFill>
+                  <a:schemeClr val="bg1"/>
+                </a:solidFill>
+                <a:latin typeface="Times New Roman Bold"/>
+              </a:rPr>
+              <a:t>{{ ceilings }} {% endif %}</a:t>
+            </a:r>
+            <a:endParaRPr lang="en-US" sz="3200" dirty="0">
+              <a:solidFill>
+                <a:srgbClr val="D40C0C"/>
+              </a:solidFill>
+              <a:latin typeface="Times New Roman Bold"/>
+            </a:endParaRPr>
           </a:p>
         </p:txBody>
       </p:sp>
@@ -4337,14 +4493,14 @@
       </p:grpSpPr>
       <p:sp>
         <p:nvSpPr>
-          <p:cNvPr id="2" name="TextBox 2"/>
+          <p:cNvPr id="5" name="TextBox 5"/>
           <p:cNvSpPr txBox="1"/>
           <p:nvPr/>
         </p:nvSpPr>
         <p:spPr>
           <a:xfrm>
-            <a:off x="5558872" y="2608746"/>
-            <a:ext cx="2755063" cy="411716"/>
+            <a:off x="7868870" y="6654519"/>
+            <a:ext cx="9576251" cy="411716"/>
           </a:xfrm>
           <a:prstGeom prst="rect">
             <a:avLst/>
@@ -4377,77 +4533,6 @@
                 </a:solidFill>
                 <a:latin typeface="Times New Roman"/>
               </a:rPr>
-              <a:t>start_price</a:t>
-            </a:r>
-            <a:r>
-              <a:rPr lang="en-US" sz="2499" dirty="0">
-                <a:solidFill>
-                  <a:srgbClr val="FFFFFF"/>
-                </a:solidFill>
-                <a:latin typeface="Times New Roman"/>
-              </a:rPr>
-              <a:t> }}</a:t>
-            </a:r>
-            <a:r>
-              <a:rPr lang="ru-RU" sz="2499" dirty="0">
-                <a:solidFill>
-                  <a:srgbClr val="FFFFFF"/>
-                </a:solidFill>
-                <a:latin typeface="Times New Roman"/>
-              </a:rPr>
-              <a:t> руб.</a:t>
-            </a:r>
-            <a:endParaRPr lang="en-US" sz="2499" dirty="0">
-              <a:solidFill>
-                <a:srgbClr val="FFFFFF"/>
-              </a:solidFill>
-              <a:latin typeface="Times New Roman"/>
-            </a:endParaRPr>
-          </a:p>
-        </p:txBody>
-      </p:sp>
-      <p:sp>
-        <p:nvSpPr>
-          <p:cNvPr id="5" name="TextBox 5"/>
-          <p:cNvSpPr txBox="1"/>
-          <p:nvPr/>
-        </p:nvSpPr>
-        <p:spPr>
-          <a:xfrm>
-            <a:off x="7683049" y="6654519"/>
-            <a:ext cx="9576251" cy="411716"/>
-          </a:xfrm>
-          <a:prstGeom prst="rect">
-            <a:avLst/>
-          </a:prstGeom>
-        </p:spPr>
-        <p:txBody>
-          <a:bodyPr lIns="0" tIns="0" rIns="0" bIns="0" rtlCol="0" anchor="t">
-            <a:spAutoFit/>
-          </a:bodyPr>
-          <a:lstStyle/>
-          <a:p>
-            <a:pPr>
-              <a:lnSpc>
-                <a:spcPts val="3499"/>
-              </a:lnSpc>
-            </a:pPr>
-            <a:r>
-              <a:rPr lang="en-US" sz="2499" dirty="0">
-                <a:solidFill>
-                  <a:srgbClr val="FFFFFF"/>
-                </a:solidFill>
-                <a:latin typeface="Times New Roman"/>
-              </a:rPr>
-              <a:t>{{ </a:t>
-            </a:r>
-            <a:r>
-              <a:rPr lang="en-US" sz="2499" dirty="0" err="1">
-                <a:solidFill>
-                  <a:srgbClr val="FFFFFF"/>
-                </a:solidFill>
-                <a:latin typeface="Times New Roman"/>
-              </a:rPr>
               <a:t>applications_enddate</a:t>
             </a:r>
             <a:r>
@@ -4470,7 +4555,7 @@
         </p:nvSpPr>
         <p:spPr>
           <a:xfrm>
-            <a:off x="7683049" y="7595088"/>
+            <a:off x="7868870" y="7595088"/>
             <a:ext cx="9576251" cy="411716"/>
           </a:xfrm>
           <a:prstGeom prst="rect">
@@ -4613,15 +4698,15 @@
         </p:nvSpPr>
         <p:spPr>
           <a:xfrm>
-            <a:off x="728579" y="2488828"/>
-            <a:ext cx="3829169" cy="648335"/>
+            <a:off x="-1066800" y="2426855"/>
+            <a:ext cx="14249400" cy="583045"/>
           </a:xfrm>
           <a:prstGeom prst="rect">
             <a:avLst/>
           </a:prstGeom>
         </p:spPr>
         <p:txBody>
-          <a:bodyPr lIns="0" tIns="0" rIns="0" bIns="0" rtlCol="0" anchor="t">
+          <a:bodyPr wrap="square" lIns="0" tIns="0" rIns="0" bIns="0" rtlCol="0" anchor="t">
             <a:spAutoFit/>
           </a:bodyPr>
           <a:lstStyle/>
@@ -4632,13 +4717,117 @@
               </a:lnSpc>
             </a:pPr>
             <a:r>
-              <a:rPr lang="en-US" sz="3499" spc="-97">
+              <a:rPr lang="en-US" dirty="0">
+                <a:solidFill>
+                  <a:srgbClr val="FFFFFF"/>
+                </a:solidFill>
+                <a:latin typeface="Times New Roman"/>
+              </a:rPr>
+              <a:t>{% if </a:t>
+            </a:r>
+            <a:r>
+              <a:rPr lang="en-US" dirty="0" err="1">
+                <a:solidFill>
+                  <a:srgbClr val="FFFFFF"/>
+                </a:solidFill>
+                <a:latin typeface="Times New Roman"/>
+              </a:rPr>
+              <a:t>start_price</a:t>
+            </a:r>
+            <a:r>
+              <a:rPr lang="en-US" dirty="0">
+                <a:solidFill>
+                  <a:srgbClr val="FFFFFF"/>
+                </a:solidFill>
+                <a:latin typeface="Times New Roman"/>
+              </a:rPr>
+              <a:t> %} </a:t>
+            </a:r>
+            <a:r>
+              <a:rPr lang="en-US" sz="3499" spc="-97" dirty="0" err="1">
                 <a:solidFill>
                   <a:srgbClr val="D40C0C"/>
                 </a:solidFill>
                 <a:latin typeface="Times New Roman Bold"/>
               </a:rPr>
-              <a:t>Начальная цена: </a:t>
+              <a:t>Начальная</a:t>
+            </a:r>
+            <a:r>
+              <a:rPr lang="en-US" sz="3499" spc="-97" dirty="0">
+                <a:solidFill>
+                  <a:srgbClr val="D40C0C"/>
+                </a:solidFill>
+                <a:latin typeface="Times New Roman Bold"/>
+              </a:rPr>
+              <a:t> </a:t>
+            </a:r>
+            <a:r>
+              <a:rPr lang="en-US" sz="3499" spc="-97" dirty="0" err="1">
+                <a:solidFill>
+                  <a:srgbClr val="D40C0C"/>
+                </a:solidFill>
+                <a:latin typeface="Times New Roman Bold"/>
+              </a:rPr>
+              <a:t>цена</a:t>
+            </a:r>
+            <a:r>
+              <a:rPr lang="en-US" sz="3499" spc="-97" dirty="0">
+                <a:solidFill>
+                  <a:srgbClr val="D40C0C"/>
+                </a:solidFill>
+                <a:latin typeface="Times New Roman Bold"/>
+              </a:rPr>
+              <a:t>:                </a:t>
+            </a:r>
+            <a:r>
+              <a:rPr lang="en-US" sz="2500" dirty="0">
+                <a:solidFill>
+                  <a:srgbClr val="FFFFFF"/>
+                </a:solidFill>
+                <a:latin typeface="Times New Roman" panose="02020603050405020304" pitchFamily="18" charset="0"/>
+                <a:cs typeface="Times New Roman" panose="02020603050405020304" pitchFamily="18" charset="0"/>
+              </a:rPr>
+              <a:t>{{ </a:t>
+            </a:r>
+            <a:r>
+              <a:rPr lang="en-US" sz="2500" dirty="0" err="1">
+                <a:solidFill>
+                  <a:srgbClr val="FFFFFF"/>
+                </a:solidFill>
+                <a:latin typeface="Times New Roman" panose="02020603050405020304" pitchFamily="18" charset="0"/>
+                <a:cs typeface="Times New Roman" panose="02020603050405020304" pitchFamily="18" charset="0"/>
+              </a:rPr>
+              <a:t>start_price</a:t>
+            </a:r>
+            <a:r>
+              <a:rPr lang="en-US" sz="2500" dirty="0">
+                <a:solidFill>
+                  <a:srgbClr val="FFFFFF"/>
+                </a:solidFill>
+                <a:latin typeface="Times New Roman" panose="02020603050405020304" pitchFamily="18" charset="0"/>
+                <a:cs typeface="Times New Roman" panose="02020603050405020304" pitchFamily="18" charset="0"/>
+              </a:rPr>
+              <a:t> }}</a:t>
+            </a:r>
+            <a:r>
+              <a:rPr lang="ru-RU" sz="2500" dirty="0">
+                <a:solidFill>
+                  <a:srgbClr val="FFFFFF"/>
+                </a:solidFill>
+                <a:latin typeface="Times New Roman" panose="02020603050405020304" pitchFamily="18" charset="0"/>
+                <a:cs typeface="Times New Roman" panose="02020603050405020304" pitchFamily="18" charset="0"/>
+              </a:rPr>
+              <a:t> руб.</a:t>
+            </a:r>
+            <a:r>
+              <a:rPr lang="en-US" sz="2500" spc="-97" dirty="0">
+                <a:solidFill>
+                  <a:srgbClr val="D40C0C"/>
+                </a:solidFill>
+                <a:latin typeface="Times New Roman" panose="02020603050405020304" pitchFamily="18" charset="0"/>
+                <a:cs typeface="Times New Roman" panose="02020603050405020304" pitchFamily="18" charset="0"/>
+              </a:rPr>
+              <a:t> {% endif %}</a:t>
             </a:r>
           </a:p>
         </p:txBody>
@@ -4651,15 +4840,15 @@
         </p:nvSpPr>
         <p:spPr>
           <a:xfrm>
-            <a:off x="728579" y="2931146"/>
-            <a:ext cx="4563982" cy="648335"/>
+            <a:off x="-990600" y="2931146"/>
+            <a:ext cx="12808092" cy="587212"/>
           </a:xfrm>
           <a:prstGeom prst="rect">
             <a:avLst/>
           </a:prstGeom>
         </p:spPr>
         <p:txBody>
-          <a:bodyPr lIns="0" tIns="0" rIns="0" bIns="0" rtlCol="0" anchor="t">
+          <a:bodyPr wrap="square" lIns="0" tIns="0" rIns="0" bIns="0" rtlCol="0" anchor="t">
             <a:spAutoFit/>
           </a:bodyPr>
           <a:lstStyle/>
@@ -4670,14 +4859,141 @@
               </a:lnSpc>
             </a:pPr>
             <a:r>
-              <a:rPr lang="en-US" sz="3499" spc="-97">
+              <a:rPr lang="en-US" dirty="0">
+                <a:solidFill>
+                  <a:srgbClr val="FFFFFF"/>
+                </a:solidFill>
+                <a:latin typeface="Times New Roman"/>
+              </a:rPr>
+              <a:t>{% if </a:t>
+            </a:r>
+            <a:r>
+              <a:rPr lang="en-US" dirty="0" err="1">
+                <a:solidFill>
+                  <a:srgbClr val="FFFFFF"/>
+                </a:solidFill>
+                <a:latin typeface="Times New Roman"/>
+              </a:rPr>
+              <a:t>min_price</a:t>
+            </a:r>
+            <a:r>
+              <a:rPr lang="en-US" dirty="0">
+                <a:solidFill>
+                  <a:srgbClr val="FFFFFF"/>
+                </a:solidFill>
+                <a:latin typeface="Times New Roman"/>
+              </a:rPr>
+              <a:t> }} </a:t>
+            </a:r>
+            <a:r>
+              <a:rPr lang="en-US" sz="3499" spc="-97" dirty="0" err="1">
                 <a:solidFill>
                   <a:srgbClr val="D40C0C"/>
                 </a:solidFill>
                 <a:latin typeface="Times New Roman Bold"/>
               </a:rPr>
-              <a:t>Минимальная цена:</a:t>
-            </a:r>
+              <a:t>Минимальная</a:t>
+            </a:r>
+            <a:r>
+              <a:rPr lang="en-US" sz="3499" spc="-97" dirty="0">
+                <a:solidFill>
+                  <a:srgbClr val="D40C0C"/>
+                </a:solidFill>
+                <a:latin typeface="Times New Roman Bold"/>
+              </a:rPr>
+              <a:t> </a:t>
+            </a:r>
+            <a:r>
+              <a:rPr lang="en-US" sz="3499" spc="-97" dirty="0" err="1">
+                <a:solidFill>
+                  <a:srgbClr val="D40C0C"/>
+                </a:solidFill>
+                <a:latin typeface="Times New Roman Bold"/>
+              </a:rPr>
+              <a:t>цена</a:t>
+            </a:r>
+            <a:r>
+              <a:rPr lang="en-US" sz="3499" spc="-97" dirty="0">
+                <a:solidFill>
+                  <a:srgbClr val="D40C0C"/>
+                </a:solidFill>
+                <a:latin typeface="Times New Roman Bold"/>
+              </a:rPr>
+              <a:t>:</a:t>
+            </a:r>
+            <a:r>
+              <a:rPr lang="en-US" sz="2500" spc="-97" dirty="0">
+                <a:solidFill>
+                  <a:srgbClr val="D40C0C"/>
+                </a:solidFill>
+                <a:latin typeface="Times New Roman Bold"/>
+              </a:rPr>
+              <a:t>              </a:t>
+            </a:r>
+            <a:r>
+              <a:rPr lang="en-US" sz="2500" dirty="0">
+                <a:solidFill>
+                  <a:srgbClr val="FFFFFF"/>
+                </a:solidFill>
+                <a:latin typeface="Times New Roman" panose="02020603050405020304" pitchFamily="18" charset="0"/>
+                <a:cs typeface="Times New Roman" panose="02020603050405020304" pitchFamily="18" charset="0"/>
+              </a:rPr>
+              <a:t>{{ </a:t>
+            </a:r>
+            <a:r>
+              <a:rPr lang="en-US" sz="2500" dirty="0" err="1">
+                <a:solidFill>
+                  <a:srgbClr val="FFFFFF"/>
+                </a:solidFill>
+                <a:latin typeface="Times New Roman"/>
+              </a:rPr>
+              <a:t>min_price</a:t>
+            </a:r>
+            <a:r>
+              <a:rPr lang="en-US" sz="2500" dirty="0">
+                <a:solidFill>
+                  <a:srgbClr val="FFFFFF"/>
+                </a:solidFill>
+                <a:latin typeface="Times New Roman"/>
+              </a:rPr>
+              <a:t> </a:t>
+            </a:r>
+            <a:r>
+              <a:rPr lang="en-US" sz="2500" dirty="0">
+                <a:solidFill>
+                  <a:srgbClr val="FFFFFF"/>
+                </a:solidFill>
+                <a:latin typeface="Times New Roman" panose="02020603050405020304" pitchFamily="18" charset="0"/>
+                <a:cs typeface="Times New Roman" panose="02020603050405020304" pitchFamily="18" charset="0"/>
+              </a:rPr>
+              <a:t>}}</a:t>
+            </a:r>
+            <a:r>
+              <a:rPr lang="ru-RU" sz="2500" dirty="0">
+                <a:solidFill>
+                  <a:srgbClr val="FFFFFF"/>
+                </a:solidFill>
+                <a:latin typeface="Times New Roman" panose="02020603050405020304" pitchFamily="18" charset="0"/>
+                <a:cs typeface="Times New Roman" panose="02020603050405020304" pitchFamily="18" charset="0"/>
+              </a:rPr>
+              <a:t> руб.</a:t>
+            </a:r>
+            <a:r>
+              <a:rPr lang="en-US" sz="2500" spc="-97" dirty="0">
+                <a:solidFill>
+                  <a:srgbClr val="D40C0C"/>
+                </a:solidFill>
+                <a:latin typeface="Times New Roman" panose="02020603050405020304" pitchFamily="18" charset="0"/>
+                <a:cs typeface="Times New Roman" panose="02020603050405020304" pitchFamily="18" charset="0"/>
+              </a:rPr>
+              <a:t> {% endif %}</a:t>
+            </a:r>
+            <a:endParaRPr lang="en-US" sz="2500" spc="-97" dirty="0">
+              <a:solidFill>
+                <a:srgbClr val="D40C0C"/>
+              </a:solidFill>
+              <a:latin typeface="Times New Roman Bold"/>
+            </a:endParaRPr>
           </a:p>
         </p:txBody>
       </p:sp>
@@ -4689,15 +5005,15 @@
         </p:nvSpPr>
         <p:spPr>
           <a:xfrm>
-            <a:off x="728579" y="3455656"/>
-            <a:ext cx="3388757" cy="648335"/>
+            <a:off x="-1295400" y="3455656"/>
+            <a:ext cx="11734800" cy="583045"/>
           </a:xfrm>
           <a:prstGeom prst="rect">
             <a:avLst/>
           </a:prstGeom>
         </p:spPr>
         <p:txBody>
-          <a:bodyPr lIns="0" tIns="0" rIns="0" bIns="0" rtlCol="0" anchor="t">
+          <a:bodyPr wrap="square" lIns="0" tIns="0" rIns="0" bIns="0" rtlCol="0" anchor="t">
             <a:spAutoFit/>
           </a:bodyPr>
           <a:lstStyle/>
@@ -4708,14 +5024,128 @@
               </a:lnSpc>
             </a:pPr>
             <a:r>
-              <a:rPr lang="en-US" sz="3499" spc="-97">
+              <a:rPr lang="en-US" dirty="0">
+                <a:solidFill>
+                  <a:srgbClr val="FFFFFF"/>
+                </a:solidFill>
+                <a:latin typeface="Times New Roman"/>
+              </a:rPr>
+              <a:t>{% if </a:t>
+            </a:r>
+            <a:r>
+              <a:rPr lang="en-US" dirty="0" err="1">
+                <a:solidFill>
+                  <a:srgbClr val="FFFFFF"/>
+                </a:solidFill>
+                <a:latin typeface="Times New Roman"/>
+              </a:rPr>
+              <a:t>auction_step</a:t>
+            </a:r>
+            <a:r>
+              <a:rPr lang="en-US" dirty="0">
+                <a:solidFill>
+                  <a:srgbClr val="FFFFFF"/>
+                </a:solidFill>
+                <a:latin typeface="Times New Roman"/>
+              </a:rPr>
+              <a:t> %} </a:t>
+            </a:r>
+            <a:r>
+              <a:rPr lang="en-US" sz="3499" spc="-97" dirty="0" err="1">
                 <a:solidFill>
                   <a:srgbClr val="D40C0C"/>
                 </a:solidFill>
                 <a:latin typeface="Times New Roman Bold"/>
               </a:rPr>
-              <a:t>Шаг аукциона: </a:t>
-            </a:r>
+              <a:t>Шаг</a:t>
+            </a:r>
+            <a:r>
+              <a:rPr lang="en-US" sz="3499" spc="-97" dirty="0">
+                <a:solidFill>
+                  <a:srgbClr val="D40C0C"/>
+                </a:solidFill>
+                <a:latin typeface="Times New Roman Bold"/>
+              </a:rPr>
+              <a:t> </a:t>
+            </a:r>
+            <a:r>
+              <a:rPr lang="en-US" sz="3499" spc="-97" dirty="0" err="1">
+                <a:solidFill>
+                  <a:srgbClr val="D40C0C"/>
+                </a:solidFill>
+                <a:latin typeface="Times New Roman Bold"/>
+              </a:rPr>
+              <a:t>аукциона</a:t>
+            </a:r>
+            <a:r>
+              <a:rPr lang="en-US" sz="3499" spc="-97" dirty="0">
+                <a:solidFill>
+                  <a:srgbClr val="D40C0C"/>
+                </a:solidFill>
+                <a:latin typeface="Times New Roman Bold"/>
+              </a:rPr>
+              <a:t>:</a:t>
+            </a:r>
+            <a:r>
+              <a:rPr lang="en-US" sz="2500" spc="-97" dirty="0">
+                <a:solidFill>
+                  <a:srgbClr val="D40C0C"/>
+                </a:solidFill>
+                <a:latin typeface="Times New Roman Bold"/>
+              </a:rPr>
+              <a:t>                              </a:t>
+            </a:r>
+            <a:r>
+              <a:rPr lang="en-US" sz="2500" spc="-97" dirty="0">
+                <a:solidFill>
+                  <a:schemeClr val="bg1"/>
+                </a:solidFill>
+                <a:latin typeface="Times New Roman Bold"/>
+              </a:rPr>
+              <a:t>{{ </a:t>
+            </a:r>
+            <a:r>
+              <a:rPr lang="en-US" sz="2500" dirty="0" err="1">
+                <a:solidFill>
+                  <a:srgbClr val="FFFFFF"/>
+                </a:solidFill>
+                <a:latin typeface="Times New Roman"/>
+              </a:rPr>
+              <a:t>auction_step</a:t>
+            </a:r>
+            <a:r>
+              <a:rPr lang="en-US" sz="2500" dirty="0">
+                <a:solidFill>
+                  <a:srgbClr val="FFFFFF"/>
+                </a:solidFill>
+                <a:latin typeface="Times New Roman"/>
+              </a:rPr>
+              <a:t> }} </a:t>
+            </a:r>
+            <a:r>
+              <a:rPr lang="ru-RU" sz="2500" dirty="0">
+                <a:solidFill>
+                  <a:srgbClr val="FFFFFF"/>
+                </a:solidFill>
+                <a:latin typeface="Times New Roman"/>
+              </a:rPr>
+              <a:t>руб. </a:t>
+            </a:r>
+            <a:r>
+              <a:rPr lang="en-US" sz="2500" dirty="0">
+                <a:solidFill>
+                  <a:srgbClr val="FFFFFF"/>
+                </a:solidFill>
+                <a:latin typeface="Times New Roman"/>
+              </a:rPr>
+              <a:t>{% endif %}</a:t>
+            </a:r>
+            <a:endParaRPr lang="en-US" sz="2500" spc="-97" dirty="0">
+              <a:solidFill>
+                <a:srgbClr val="D40C0C"/>
+              </a:solidFill>
+              <a:latin typeface="Times New Roman Bold"/>
+            </a:endParaRPr>
           </a:p>
         </p:txBody>
       </p:sp>
@@ -4727,7 +5157,7 @@
         </p:nvSpPr>
         <p:spPr>
           <a:xfrm>
-            <a:off x="728579" y="6561113"/>
+            <a:off x="914400" y="6561113"/>
             <a:ext cx="6085284" cy="648335"/>
           </a:xfrm>
           <a:prstGeom prst="rect">
@@ -4746,13 +5176,58 @@
               </a:lnSpc>
             </a:pPr>
             <a:r>
-              <a:rPr lang="en-US" sz="3499" spc="-97">
+              <a:rPr lang="en-US" sz="3499" spc="-97" dirty="0" err="1">
                 <a:solidFill>
                   <a:srgbClr val="D40C0C"/>
                 </a:solidFill>
                 <a:latin typeface="Times New Roman Bold"/>
               </a:rPr>
-              <a:t>Окончание приема заявок:</a:t>
+              <a:t>Окончание</a:t>
+            </a:r>
+            <a:r>
+              <a:rPr lang="en-US" sz="3499" spc="-97" dirty="0">
+                <a:solidFill>
+                  <a:srgbClr val="D40C0C"/>
+                </a:solidFill>
+                <a:latin typeface="Times New Roman Bold"/>
+              </a:rPr>
+              <a:t> </a:t>
+            </a:r>
+            <a:r>
+              <a:rPr lang="en-US" sz="3499" spc="-97" dirty="0" err="1">
+                <a:solidFill>
+                  <a:srgbClr val="D40C0C"/>
+                </a:solidFill>
+                <a:latin typeface="Times New Roman Bold"/>
+              </a:rPr>
+              <a:t>приема</a:t>
+            </a:r>
+            <a:r>
+              <a:rPr lang="en-US" sz="3499" spc="-97" dirty="0">
+                <a:solidFill>
+                  <a:srgbClr val="D40C0C"/>
+                </a:solidFill>
+                <a:latin typeface="Times New Roman Bold"/>
+              </a:rPr>
+              <a:t> </a:t>
+            </a:r>
+            <a:r>
+              <a:rPr lang="en-US" sz="3499" spc="-97" dirty="0" err="1">
+                <a:solidFill>
+                  <a:srgbClr val="D40C0C"/>
+                </a:solidFill>
+                <a:latin typeface="Times New Roman Bold"/>
+              </a:rPr>
+              <a:t>заявок</a:t>
+            </a:r>
+            <a:r>
+              <a:rPr lang="en-US" sz="3499" spc="-97" dirty="0">
+                <a:solidFill>
+                  <a:srgbClr val="D40C0C"/>
+                </a:solidFill>
+                <a:latin typeface="Times New Roman Bold"/>
+              </a:rPr>
+              <a:t>:</a:t>
             </a:r>
           </a:p>
         </p:txBody>
@@ -4765,7 +5240,7 @@
         </p:nvSpPr>
         <p:spPr>
           <a:xfrm>
-            <a:off x="728579" y="7085623"/>
+            <a:off x="914400" y="7085623"/>
             <a:ext cx="4540330" cy="648335"/>
           </a:xfrm>
           <a:prstGeom prst="rect">
@@ -4784,13 +5259,40 @@
               </a:lnSpc>
             </a:pPr>
             <a:r>
-              <a:rPr lang="en-US" sz="3499" spc="-97">
+              <a:rPr lang="en-US" sz="3499" spc="-97" dirty="0" err="1">
                 <a:solidFill>
                   <a:srgbClr val="D40C0C"/>
                 </a:solidFill>
                 <a:latin typeface="Times New Roman Bold"/>
               </a:rPr>
-              <a:t>Проведение торгов: </a:t>
+              <a:t>Проведение</a:t>
+            </a:r>
+            <a:r>
+              <a:rPr lang="en-US" sz="3499" spc="-97" dirty="0">
+                <a:solidFill>
+                  <a:srgbClr val="D40C0C"/>
+                </a:solidFill>
+                <a:latin typeface="Times New Roman Bold"/>
+              </a:rPr>
+              <a:t> </a:t>
+            </a:r>
+            <a:r>
+              <a:rPr lang="en-US" sz="3499" spc="-97" dirty="0" err="1">
+                <a:solidFill>
+                  <a:srgbClr val="D40C0C"/>
+                </a:solidFill>
+                <a:latin typeface="Times New Roman Bold"/>
+              </a:rPr>
+              <a:t>торгов</a:t>
+            </a:r>
+            <a:r>
+              <a:rPr lang="en-US" sz="3499" spc="-97" dirty="0">
+                <a:solidFill>
+                  <a:srgbClr val="D40C0C"/>
+                </a:solidFill>
+                <a:latin typeface="Times New Roman Bold"/>
+              </a:rPr>
+              <a:t>: </a:t>
             </a:r>
           </a:p>
         </p:txBody>
@@ -4803,7 +5305,7 @@
         </p:nvSpPr>
         <p:spPr>
           <a:xfrm>
-            <a:off x="728579" y="7566513"/>
+            <a:off x="914400" y="7566513"/>
             <a:ext cx="4824889" cy="648335"/>
           </a:xfrm>
           <a:prstGeom prst="rect">
@@ -4898,14 +5400,29 @@
               </a:lnSpc>
             </a:pPr>
             <a:r>
-              <a:rPr lang="en-US" sz="2499">
+              <a:rPr lang="en-US" sz="2499" dirty="0">
                 <a:solidFill>
                   <a:srgbClr val="000000"/>
                 </a:solidFill>
                 <a:latin typeface="Times New Roman"/>
               </a:rPr>
-              <a:t>49 009,01 руб</a:t>
-            </a:r>
+              <a:t>49 009,01 </a:t>
+            </a:r>
+            <a:r>
+              <a:rPr lang="en-US" sz="2499" dirty="0" err="1">
+                <a:solidFill>
+                  <a:srgbClr val="000000"/>
+                </a:solidFill>
+                <a:latin typeface="Times New Roman"/>
+              </a:rPr>
+              <a:t>руб</a:t>
+            </a:r>
+            <a:endParaRPr lang="en-US" sz="2499" dirty="0">
+              <a:solidFill>
+                <a:srgbClr val="000000"/>
+              </a:solidFill>
+              <a:latin typeface="Times New Roman"/>
+            </a:endParaRPr>
           </a:p>
         </p:txBody>
       </p:sp>
@@ -4955,15 +5472,15 @@
         </p:nvSpPr>
         <p:spPr>
           <a:xfrm>
-            <a:off x="8580635" y="2488828"/>
-            <a:ext cx="2779657" cy="648335"/>
+            <a:off x="8580635" y="2376406"/>
+            <a:ext cx="11155165" cy="583045"/>
           </a:xfrm>
           <a:prstGeom prst="rect">
             <a:avLst/>
           </a:prstGeom>
         </p:spPr>
         <p:txBody>
-          <a:bodyPr lIns="0" tIns="0" rIns="0" bIns="0" rtlCol="0" anchor="t">
+          <a:bodyPr wrap="square" lIns="0" tIns="0" rIns="0" bIns="0" rtlCol="0" anchor="t">
             <a:spAutoFit/>
           </a:bodyPr>
           <a:lstStyle/>
@@ -4974,51 +5491,76 @@
               </a:lnSpc>
             </a:pPr>
             <a:r>
-              <a:rPr lang="en-US" sz="3499" spc="-97">
+              <a:rPr lang="en-US" sz="2500" spc="-97" dirty="0">
+                <a:solidFill>
+                  <a:schemeClr val="bg1"/>
+                </a:solidFill>
+                <a:latin typeface="Times New Roman Bold"/>
+              </a:rPr>
+              <a:t>{% if m1_start_price %} </a:t>
+            </a:r>
+            <a:r>
+              <a:rPr lang="en-US" sz="3499" spc="-97" dirty="0" err="1">
                 <a:solidFill>
                   <a:srgbClr val="D40C0C"/>
                 </a:solidFill>
                 <a:latin typeface="Times New Roman Bold"/>
               </a:rPr>
-              <a:t>цена 1 кв.м: </a:t>
-            </a:r>
-          </a:p>
-        </p:txBody>
-      </p:sp>
-      <p:sp>
-        <p:nvSpPr>
-          <p:cNvPr id="20" name="TextBox 20"/>
-          <p:cNvSpPr txBox="1"/>
-          <p:nvPr/>
-        </p:nvSpPr>
-        <p:spPr>
-          <a:xfrm>
-            <a:off x="8580635" y="2931146"/>
-            <a:ext cx="4563982" cy="648335"/>
-          </a:xfrm>
-          <a:prstGeom prst="rect">
-            <a:avLst/>
-          </a:prstGeom>
-        </p:spPr>
-        <p:txBody>
-          <a:bodyPr lIns="0" tIns="0" rIns="0" bIns="0" rtlCol="0" anchor="t">
-            <a:spAutoFit/>
-          </a:bodyPr>
-          <a:lstStyle/>
-          <a:p>
-            <a:pPr>
-              <a:lnSpc>
-                <a:spcPts val="4794"/>
-              </a:lnSpc>
-            </a:pPr>
-            <a:r>
-              <a:rPr lang="en-US" sz="3499" spc="-97">
+              <a:t>цена</a:t>
+            </a:r>
+            <a:r>
+              <a:rPr lang="en-US" sz="3499" spc="-97" dirty="0">
                 <a:solidFill>
                   <a:srgbClr val="D40C0C"/>
                 </a:solidFill>
                 <a:latin typeface="Times New Roman Bold"/>
               </a:rPr>
-              <a:t>цена 1 кв.м: </a:t>
+              <a:t> 1 </a:t>
+            </a:r>
+            <a:r>
+              <a:rPr lang="en-US" sz="3499" spc="-97" dirty="0" err="1">
+                <a:solidFill>
+                  <a:srgbClr val="D40C0C"/>
+                </a:solidFill>
+                <a:latin typeface="Times New Roman Bold"/>
+              </a:rPr>
+              <a:t>кв.м</a:t>
+            </a:r>
+            <a:r>
+              <a:rPr lang="en-US" sz="3499" spc="-97" dirty="0">
+                <a:solidFill>
+                  <a:srgbClr val="D40C0C"/>
+                </a:solidFill>
+                <a:latin typeface="Times New Roman Bold"/>
+              </a:rPr>
+              <a:t>: </a:t>
+            </a:r>
+            <a:r>
+              <a:rPr lang="en-US" sz="2500" spc="-97" dirty="0">
+                <a:solidFill>
+                  <a:schemeClr val="bg1"/>
+                </a:solidFill>
+                <a:latin typeface="Times New Roman Bold"/>
+              </a:rPr>
+              <a:t>{{ m1_start_price }} </a:t>
+            </a:r>
+            <a:r>
+              <a:rPr lang="ru-RU" sz="2500" spc="-97" dirty="0">
+                <a:solidFill>
+                  <a:schemeClr val="bg1"/>
+                </a:solidFill>
+                <a:latin typeface="Times New Roman Bold"/>
+              </a:rPr>
+              <a:t>руб.</a:t>
+            </a:r>
+            <a:r>
+              <a:rPr lang="en-US" sz="2500" spc="-97" dirty="0">
+                <a:solidFill>
+                  <a:schemeClr val="bg1"/>
+                </a:solidFill>
+                <a:latin typeface="Times New Roman Bold"/>
+              </a:rPr>
+              <a:t> {% endif %}</a:t>
             </a:r>
           </a:p>
         </p:txBody>
@@ -5313,6 +5855,113 @@
                 <a:latin typeface="Times New Roman Bold"/>
               </a:rPr>
               <a:t>Информация об электронных торгах:</a:t>
+            </a:r>
+          </a:p>
+        </p:txBody>
+      </p:sp>
+      <p:sp>
+        <p:nvSpPr>
+          <p:cNvPr id="3" name="TextBox 19">
+            <a:extLst>
+              <a:ext uri="{FF2B5EF4-FFF2-40B4-BE49-F238E27FC236}">
+                <a16:creationId xmlns:a16="http://schemas.microsoft.com/office/drawing/2014/main" id="{9ADEFAF2-85FD-ED37-9B69-5113E5B8A5FE}"/>
+              </a:ext>
+            </a:extLst>
+          </p:cNvPr>
+          <p:cNvSpPr txBox="1"/>
+          <p:nvPr/>
+        </p:nvSpPr>
+        <p:spPr>
+          <a:xfrm>
+            <a:off x="8686800" y="2884055"/>
+            <a:ext cx="11155165" cy="583045"/>
+          </a:xfrm>
+          <a:prstGeom prst="rect">
+            <a:avLst/>
+          </a:prstGeom>
+        </p:spPr>
+        <p:txBody>
+          <a:bodyPr wrap="square" lIns="0" tIns="0" rIns="0" bIns="0" rtlCol="0" anchor="t">
+            <a:spAutoFit/>
+          </a:bodyPr>
+          <a:lstStyle/>
+          <a:p>
+            <a:pPr>
+              <a:lnSpc>
+                <a:spcPts val="4794"/>
+              </a:lnSpc>
+            </a:pPr>
+            <a:r>
+              <a:rPr lang="en-US" sz="2500" spc="-97" dirty="0">
+                <a:solidFill>
+                  <a:schemeClr val="bg1"/>
+                </a:solidFill>
+                <a:latin typeface="Times New Roman Bold"/>
+              </a:rPr>
+              <a:t>{% if m1_min_price %} </a:t>
+            </a:r>
+            <a:r>
+              <a:rPr lang="en-US" sz="3499" spc="-97" dirty="0" err="1">
+                <a:solidFill>
+                  <a:srgbClr val="D40C0C"/>
+                </a:solidFill>
+                <a:latin typeface="Times New Roman Bold"/>
+              </a:rPr>
+              <a:t>цена</a:t>
+            </a:r>
+            <a:r>
+              <a:rPr lang="en-US" sz="3499" spc="-97" dirty="0">
+                <a:solidFill>
+                  <a:srgbClr val="D40C0C"/>
+                </a:solidFill>
+                <a:latin typeface="Times New Roman Bold"/>
+              </a:rPr>
+              <a:t> 1 </a:t>
+            </a:r>
+            <a:r>
+              <a:rPr lang="en-US" sz="3499" spc="-97" dirty="0" err="1">
+                <a:solidFill>
+                  <a:srgbClr val="D40C0C"/>
+                </a:solidFill>
+                <a:latin typeface="Times New Roman Bold"/>
+              </a:rPr>
+              <a:t>кв.м</a:t>
+            </a:r>
+            <a:r>
+              <a:rPr lang="en-US" sz="3499" spc="-97" dirty="0">
+                <a:solidFill>
+                  <a:srgbClr val="D40C0C"/>
+                </a:solidFill>
+                <a:latin typeface="Times New Roman Bold"/>
+              </a:rPr>
+              <a:t>: </a:t>
+            </a:r>
+            <a:r>
+              <a:rPr lang="en-US" sz="2500" spc="-97" dirty="0">
+                <a:solidFill>
+                  <a:schemeClr val="bg1"/>
+                </a:solidFill>
+                <a:latin typeface="Times New Roman Bold"/>
+              </a:rPr>
+              <a:t>{{ m1_min_price }} </a:t>
+            </a:r>
+            <a:r>
+              <a:rPr lang="ru-RU" sz="2500" spc="-97" dirty="0">
+                <a:solidFill>
+                  <a:schemeClr val="bg1"/>
+                </a:solidFill>
+                <a:latin typeface="Times New Roman Bold"/>
+              </a:rPr>
+              <a:t>руб.</a:t>
+            </a:r>
+            <a:r>
+              <a:rPr lang="en-US" sz="2500" spc="-97" dirty="0">
+                <a:solidFill>
+                  <a:schemeClr val="bg1"/>
+                </a:solidFill>
+                <a:latin typeface="Times New Roman Bold"/>
+              </a:rPr>
+              <a:t> {% endif %}</a:t>
             </a:r>
           </a:p>
         </p:txBody>

</xml_diff>